<commit_message>
M1 C3 P2 e M2 C2 P1
</commit_message>
<xml_diff>
--- a/curso/modulo1capitulo3.pptx
+++ b/curso/modulo1capitulo3.pptx
@@ -48,10 +48,8 @@
     <p:sldId id="296" r:id="rId42"/>
     <p:sldId id="297" r:id="rId43"/>
     <p:sldId id="298" r:id="rId44"/>
-    <p:sldId id="302" r:id="rId45"/>
-    <p:sldId id="303" r:id="rId46"/>
-    <p:sldId id="304" r:id="rId47"/>
-    <p:sldId id="305" r:id="rId48"/>
+    <p:sldId id="303" r:id="rId45"/>
+    <p:sldId id="304" r:id="rId46"/>
   </p:sldIdLst>
   <p:sldSz cx="9144000" cy="6858000" type="screen4x3"/>
   <p:notesSz cx="6858000" cy="9144000"/>
@@ -538,7 +536,7 @@
             <a:fld id="{F1147585-7079-4E30-9866-145D41F3556B}" type="datetimeFigureOut">
               <a:rPr lang="pt-BR" smtClean="0"/>
               <a:pPr/>
-              <a:t>8/8/2015</a:t>
+              <a:t>15/8/2015</a:t>
             </a:fld>
             <a:endParaRPr lang="pt-BR"/>
           </a:p>
@@ -705,7 +703,7 @@
             <a:fld id="{F1147585-7079-4E30-9866-145D41F3556B}" type="datetimeFigureOut">
               <a:rPr lang="pt-BR" smtClean="0"/>
               <a:pPr/>
-              <a:t>8/8/2015</a:t>
+              <a:t>15/8/2015</a:t>
             </a:fld>
             <a:endParaRPr lang="pt-BR"/>
           </a:p>
@@ -882,7 +880,7 @@
             <a:fld id="{F1147585-7079-4E30-9866-145D41F3556B}" type="datetimeFigureOut">
               <a:rPr lang="pt-BR" smtClean="0"/>
               <a:pPr/>
-              <a:t>8/8/2015</a:t>
+              <a:t>15/8/2015</a:t>
             </a:fld>
             <a:endParaRPr lang="pt-BR"/>
           </a:p>
@@ -1053,7 +1051,7 @@
             <a:fld id="{F1147585-7079-4E30-9866-145D41F3556B}" type="datetimeFigureOut">
               <a:rPr lang="pt-BR" smtClean="0"/>
               <a:pPr/>
-              <a:t>8/8/2015</a:t>
+              <a:t>15/8/2015</a:t>
             </a:fld>
             <a:endParaRPr lang="pt-BR"/>
           </a:p>
@@ -1510,7 +1508,7 @@
             <a:fld id="{F1147585-7079-4E30-9866-145D41F3556B}" type="datetimeFigureOut">
               <a:rPr lang="pt-BR" smtClean="0"/>
               <a:pPr/>
-              <a:t>8/8/2015</a:t>
+              <a:t>15/8/2015</a:t>
             </a:fld>
             <a:endParaRPr lang="pt-BR"/>
           </a:p>
@@ -1776,7 +1774,7 @@
             <a:fld id="{F1147585-7079-4E30-9866-145D41F3556B}" type="datetimeFigureOut">
               <a:rPr lang="pt-BR" smtClean="0"/>
               <a:pPr/>
-              <a:t>8/8/2015</a:t>
+              <a:t>15/8/2015</a:t>
             </a:fld>
             <a:endParaRPr lang="pt-BR"/>
           </a:p>
@@ -2152,7 +2150,7 @@
             <a:fld id="{F1147585-7079-4E30-9866-145D41F3556B}" type="datetimeFigureOut">
               <a:rPr lang="pt-BR" smtClean="0"/>
               <a:pPr/>
-              <a:t>8/8/2015</a:t>
+              <a:t>15/8/2015</a:t>
             </a:fld>
             <a:endParaRPr lang="pt-BR"/>
           </a:p>
@@ -2276,7 +2274,7 @@
             <a:fld id="{F1147585-7079-4E30-9866-145D41F3556B}" type="datetimeFigureOut">
               <a:rPr lang="pt-BR" smtClean="0"/>
               <a:pPr/>
-              <a:t>8/8/2015</a:t>
+              <a:t>15/8/2015</a:t>
             </a:fld>
             <a:endParaRPr lang="pt-BR"/>
           </a:p>
@@ -2368,7 +2366,7 @@
             <a:fld id="{F1147585-7079-4E30-9866-145D41F3556B}" type="datetimeFigureOut">
               <a:rPr lang="pt-BR" smtClean="0"/>
               <a:pPr/>
-              <a:t>8/8/2015</a:t>
+              <a:t>15/8/2015</a:t>
             </a:fld>
             <a:endParaRPr lang="pt-BR"/>
           </a:p>
@@ -2619,7 +2617,7 @@
             <a:fld id="{F1147585-7079-4E30-9866-145D41F3556B}" type="datetimeFigureOut">
               <a:rPr lang="pt-BR" smtClean="0"/>
               <a:pPr/>
-              <a:t>8/8/2015</a:t>
+              <a:t>15/8/2015</a:t>
             </a:fld>
             <a:endParaRPr lang="pt-BR"/>
           </a:p>
@@ -2880,7 +2878,7 @@
             <a:fld id="{F1147585-7079-4E30-9866-145D41F3556B}" type="datetimeFigureOut">
               <a:rPr lang="pt-BR" smtClean="0"/>
               <a:pPr/>
-              <a:t>8/8/2015</a:t>
+              <a:t>15/8/2015</a:t>
             </a:fld>
             <a:endParaRPr lang="pt-BR"/>
           </a:p>
@@ -3286,7 +3284,7 @@
             <a:fld id="{F1147585-7079-4E30-9866-145D41F3556B}" type="datetimeFigureOut">
               <a:rPr lang="pt-BR" smtClean="0"/>
               <a:pPr/>
-              <a:t>8/8/2015</a:t>
+              <a:t>15/8/2015</a:t>
             </a:fld>
             <a:endParaRPr lang="pt-BR"/>
           </a:p>
@@ -5089,13 +5087,8 @@
           <a:p>
             <a:r>
               <a:rPr lang="pt-BR" dirty="0" smtClean="0"/>
-              <a:t>Fluxo de </a:t>
-            </a:r>
-            <a:r>
-              <a:rPr lang="pt-BR" dirty="0" smtClean="0"/>
-              <a:t>Código</a:t>
-            </a:r>
-            <a:endParaRPr lang="pt-BR" dirty="0" smtClean="0"/>
+              <a:t>Fluxo de Código</a:t>
+            </a:r>
           </a:p>
           <a:p>
             <a:r>
@@ -9416,7 +9409,7 @@
           <a:p>
             <a:r>
               <a:rPr lang="pt-BR" dirty="0" smtClean="0"/>
-              <a:t>Exercícios com </a:t>
+              <a:t>Tipo </a:t>
             </a:r>
             <a:r>
               <a:rPr lang="pt-BR" dirty="0" err="1" smtClean="0">
@@ -9424,7 +9417,7 @@
                   <a:srgbClr val="92D050"/>
                 </a:solidFill>
               </a:rPr>
-              <a:t>if</a:t>
+              <a:t>enum</a:t>
             </a:r>
             <a:endParaRPr lang="pt-BR" dirty="0">
               <a:solidFill>
@@ -9451,9 +9444,58 @@
           <a:p>
             <a:r>
               <a:rPr lang="pt-BR" dirty="0" smtClean="0"/>
-              <a:t>Lista 3, 1 ao 10.</a:t>
-            </a:r>
-            <a:endParaRPr lang="pt-BR" dirty="0"/>
+              <a:t>O tipo </a:t>
+            </a:r>
+            <a:r>
+              <a:rPr lang="pt-BR" dirty="0" err="1" smtClean="0">
+                <a:solidFill>
+                  <a:srgbClr val="92D050"/>
+                </a:solidFill>
+              </a:rPr>
+              <a:t>enum</a:t>
+            </a:r>
+            <a:r>
+              <a:rPr lang="pt-BR" dirty="0" smtClean="0"/>
+              <a:t> indica “enumeração”</a:t>
+            </a:r>
+          </a:p>
+          <a:p>
+            <a:r>
+              <a:rPr lang="pt-BR" dirty="0" err="1" smtClean="0">
+                <a:solidFill>
+                  <a:srgbClr val="92D050"/>
+                </a:solidFill>
+              </a:rPr>
+              <a:t>enum</a:t>
+            </a:r>
+            <a:r>
+              <a:rPr lang="pt-BR" dirty="0" smtClean="0"/>
+              <a:t> é uma série de inteiros constantes que podem ser representadas por um nome significativo</a:t>
+            </a:r>
+          </a:p>
+          <a:p>
+            <a:r>
+              <a:rPr lang="pt-BR" dirty="0" smtClean="0"/>
+              <a:t>Cada definição de </a:t>
+            </a:r>
+            <a:r>
+              <a:rPr lang="pt-BR" dirty="0" err="1" smtClean="0">
+                <a:solidFill>
+                  <a:srgbClr val="92D050"/>
+                </a:solidFill>
+              </a:rPr>
+              <a:t>enum</a:t>
+            </a:r>
+            <a:r>
+              <a:rPr lang="pt-BR" dirty="0" smtClean="0"/>
+              <a:t> cria um novo tipo de variável</a:t>
+            </a:r>
+          </a:p>
+          <a:p>
+            <a:r>
+              <a:rPr lang="pt-BR" dirty="0" smtClean="0"/>
+              <a:t>Muito útil quando queremos limitar os valores possíveis</a:t>
+            </a:r>
           </a:p>
         </p:txBody>
       </p:sp>
@@ -9499,15 +9541,15 @@
           <a:p>
             <a:r>
               <a:rPr lang="pt-BR" dirty="0" smtClean="0"/>
-              <a:t>Tipo </a:t>
-            </a:r>
-            <a:r>
-              <a:rPr lang="pt-BR" dirty="0" err="1" smtClean="0">
+              <a:t>Operador Condicional </a:t>
+            </a:r>
+            <a:r>
+              <a:rPr lang="pt-BR" dirty="0" smtClean="0">
                 <a:solidFill>
                   <a:srgbClr val="92D050"/>
                 </a:solidFill>
               </a:rPr>
-              <a:t>enum</a:t>
+              <a:t>switch</a:t>
             </a:r>
             <a:endParaRPr lang="pt-BR" dirty="0">
               <a:solidFill>
@@ -9529,138 +9571,6 @@
         </p:nvSpPr>
         <p:spPr/>
         <p:txBody>
-          <a:bodyPr/>
-          <a:lstStyle/>
-          <a:p>
-            <a:r>
-              <a:rPr lang="pt-BR" dirty="0" smtClean="0"/>
-              <a:t>O tipo </a:t>
-            </a:r>
-            <a:r>
-              <a:rPr lang="pt-BR" dirty="0" err="1" smtClean="0">
-                <a:solidFill>
-                  <a:srgbClr val="92D050"/>
-                </a:solidFill>
-              </a:rPr>
-              <a:t>enum</a:t>
-            </a:r>
-            <a:r>
-              <a:rPr lang="pt-BR" dirty="0" smtClean="0"/>
-              <a:t> indica “enumeração”</a:t>
-            </a:r>
-          </a:p>
-          <a:p>
-            <a:r>
-              <a:rPr lang="pt-BR" dirty="0" err="1" smtClean="0">
-                <a:solidFill>
-                  <a:srgbClr val="92D050"/>
-                </a:solidFill>
-              </a:rPr>
-              <a:t>enum</a:t>
-            </a:r>
-            <a:r>
-              <a:rPr lang="pt-BR" dirty="0" smtClean="0"/>
-              <a:t> é uma série de inteiros constantes que podem ser representadas por um nome significativo</a:t>
-            </a:r>
-          </a:p>
-          <a:p>
-            <a:r>
-              <a:rPr lang="pt-BR" dirty="0" smtClean="0"/>
-              <a:t>Cada definição de </a:t>
-            </a:r>
-            <a:r>
-              <a:rPr lang="pt-BR" dirty="0" err="1" smtClean="0">
-                <a:solidFill>
-                  <a:srgbClr val="92D050"/>
-                </a:solidFill>
-              </a:rPr>
-              <a:t>enum</a:t>
-            </a:r>
-            <a:r>
-              <a:rPr lang="pt-BR" dirty="0" smtClean="0"/>
-              <a:t> cria um novo tipo de variável</a:t>
-            </a:r>
-          </a:p>
-          <a:p>
-            <a:r>
-              <a:rPr lang="pt-BR" dirty="0" smtClean="0"/>
-              <a:t>Muito útil quando queremos limitar os valores possíveis</a:t>
-            </a:r>
-          </a:p>
-        </p:txBody>
-      </p:sp>
-    </p:spTree>
-  </p:cSld>
-  <p:clrMapOvr>
-    <a:masterClrMapping/>
-  </p:clrMapOvr>
-</p:sld>
-</file>
-
-<file path=ppt/slides/slide46.xml><?xml version="1.0" encoding="utf-8"?>
-<p:sld xmlns:a="http://schemas.openxmlformats.org/drawingml/2006/main" xmlns:r="http://schemas.openxmlformats.org/officeDocument/2006/relationships" xmlns:p="http://schemas.openxmlformats.org/presentationml/2006/main">
-  <p:cSld>
-    <p:spTree>
-      <p:nvGrpSpPr>
-        <p:cNvPr id="1" name=""/>
-        <p:cNvGrpSpPr/>
-        <p:nvPr/>
-      </p:nvGrpSpPr>
-      <p:grpSpPr>
-        <a:xfrm>
-          <a:off x="0" y="0"/>
-          <a:ext cx="0" cy="0"/>
-          <a:chOff x="0" y="0"/>
-          <a:chExt cx="0" cy="0"/>
-        </a:xfrm>
-      </p:grpSpPr>
-      <p:sp>
-        <p:nvSpPr>
-          <p:cNvPr id="2" name="Título 1"/>
-          <p:cNvSpPr>
-            <a:spLocks noGrp="1"/>
-          </p:cNvSpPr>
-          <p:nvPr>
-            <p:ph type="title"/>
-          </p:nvPr>
-        </p:nvSpPr>
-        <p:spPr/>
-        <p:txBody>
-          <a:bodyPr/>
-          <a:lstStyle/>
-          <a:p>
-            <a:r>
-              <a:rPr lang="pt-BR" dirty="0" smtClean="0"/>
-              <a:t>Operador Condicional </a:t>
-            </a:r>
-            <a:r>
-              <a:rPr lang="pt-BR" dirty="0" smtClean="0">
-                <a:solidFill>
-                  <a:srgbClr val="92D050"/>
-                </a:solidFill>
-              </a:rPr>
-              <a:t>switch</a:t>
-            </a:r>
-            <a:endParaRPr lang="pt-BR" dirty="0">
-              <a:solidFill>
-                <a:srgbClr val="92D050"/>
-              </a:solidFill>
-            </a:endParaRPr>
-          </a:p>
-        </p:txBody>
-      </p:sp>
-      <p:sp>
-        <p:nvSpPr>
-          <p:cNvPr id="3" name="Espaço Reservado para Conteúdo 2"/>
-          <p:cNvSpPr>
-            <a:spLocks noGrp="1"/>
-          </p:cNvSpPr>
-          <p:nvPr>
-            <p:ph idx="1"/>
-          </p:nvPr>
-        </p:nvSpPr>
-        <p:spPr/>
-        <p:txBody>
           <a:bodyPr>
             <a:normAutofit lnSpcReduction="10000"/>
           </a:bodyPr>
@@ -9805,89 +9715,6 @@
             </a:r>
           </a:p>
           <a:p>
-            <a:endParaRPr lang="pt-BR" dirty="0"/>
-          </a:p>
-        </p:txBody>
-      </p:sp>
-    </p:spTree>
-  </p:cSld>
-  <p:clrMapOvr>
-    <a:masterClrMapping/>
-  </p:clrMapOvr>
-</p:sld>
-</file>
-
-<file path=ppt/slides/slide47.xml><?xml version="1.0" encoding="utf-8"?>
-<p:sld xmlns:a="http://schemas.openxmlformats.org/drawingml/2006/main" xmlns:r="http://schemas.openxmlformats.org/officeDocument/2006/relationships" xmlns:p="http://schemas.openxmlformats.org/presentationml/2006/main">
-  <p:cSld>
-    <p:spTree>
-      <p:nvGrpSpPr>
-        <p:cNvPr id="1" name=""/>
-        <p:cNvGrpSpPr/>
-        <p:nvPr/>
-      </p:nvGrpSpPr>
-      <p:grpSpPr>
-        <a:xfrm>
-          <a:off x="0" y="0"/>
-          <a:ext cx="0" cy="0"/>
-          <a:chOff x="0" y="0"/>
-          <a:chExt cx="0" cy="0"/>
-        </a:xfrm>
-      </p:grpSpPr>
-      <p:sp>
-        <p:nvSpPr>
-          <p:cNvPr id="2" name="Título 1"/>
-          <p:cNvSpPr>
-            <a:spLocks noGrp="1"/>
-          </p:cNvSpPr>
-          <p:nvPr>
-            <p:ph type="title"/>
-          </p:nvPr>
-        </p:nvSpPr>
-        <p:spPr/>
-        <p:txBody>
-          <a:bodyPr/>
-          <a:lstStyle/>
-          <a:p>
-            <a:r>
-              <a:rPr lang="pt-BR" dirty="0" smtClean="0"/>
-              <a:t>Exercícios com </a:t>
-            </a:r>
-            <a:r>
-              <a:rPr lang="pt-BR" dirty="0" smtClean="0">
-                <a:solidFill>
-                  <a:srgbClr val="92D050"/>
-                </a:solidFill>
-              </a:rPr>
-              <a:t>switch</a:t>
-            </a:r>
-            <a:endParaRPr lang="pt-BR" dirty="0">
-              <a:solidFill>
-                <a:srgbClr val="92D050"/>
-              </a:solidFill>
-            </a:endParaRPr>
-          </a:p>
-        </p:txBody>
-      </p:sp>
-      <p:sp>
-        <p:nvSpPr>
-          <p:cNvPr id="3" name="Espaço Reservado para Conteúdo 2"/>
-          <p:cNvSpPr>
-            <a:spLocks noGrp="1"/>
-          </p:cNvSpPr>
-          <p:nvPr>
-            <p:ph idx="1"/>
-          </p:nvPr>
-        </p:nvSpPr>
-        <p:spPr/>
-        <p:txBody>
-          <a:bodyPr/>
-          <a:lstStyle/>
-          <a:p>
-            <a:r>
-              <a:rPr lang="pt-BR" dirty="0" smtClean="0"/>
-              <a:t>Lista 3, 11 ao 14.</a:t>
-            </a:r>
             <a:endParaRPr lang="pt-BR" dirty="0"/>
           </a:p>
         </p:txBody>

</xml_diff>